<commit_message>
BUILD: Convert project from using .env to use env variables
</commit_message>
<xml_diff>
--- a/Selenium with Java Presentation.pptx
+++ b/Selenium with Java Presentation.pptx
@@ -5,30 +5,32 @@
     <p:sldMasterId id="2147483648" r:id="rId1"/>
   </p:sldMasterIdLst>
   <p:notesMasterIdLst>
-    <p:notesMasterId r:id="rId8"/>
+    <p:notesMasterId r:id="rId9"/>
   </p:notesMasterIdLst>
   <p:sldIdLst>
     <p:sldId id="256" r:id="rId2"/>
     <p:sldId id="257" r:id="rId3"/>
     <p:sldId id="258" r:id="rId4"/>
     <p:sldId id="259" r:id="rId5"/>
-    <p:sldId id="260" r:id="rId6"/>
-    <p:sldId id="270" r:id="rId7"/>
+    <p:sldId id="271" r:id="rId6"/>
+    <p:sldId id="260" r:id="rId7"/>
+    <p:sldId id="270" r:id="rId8"/>
   </p:sldIdLst>
   <p:sldSz cx="13011150" cy="7315200"/>
   <p:notesSz cx="6858000" cy="9144000"/>
   <p:embeddedFontLst>
     <p:embeddedFont>
       <p:font typeface="Calibri" panose="020F0502020204030204" pitchFamily="34" charset="0"/>
-      <p:regular r:id="rId9"/>
-      <p:bold r:id="rId10"/>
-      <p:italic r:id="rId11"/>
-      <p:boldItalic r:id="rId12"/>
+      <p:regular r:id="rId10"/>
+      <p:bold r:id="rId11"/>
+      <p:italic r:id="rId12"/>
+      <p:boldItalic r:id="rId13"/>
     </p:embeddedFont>
     <p:embeddedFont>
       <p:font typeface="Poppins" panose="00000500000000000000" pitchFamily="2" charset="0"/>
-      <p:regular r:id="rId13"/>
-      <p:bold r:id="rId14"/>
+      <p:regular r:id="rId14"/>
+      <p:bold r:id="rId15"/>
+      <p:italic r:id="rId16"/>
     </p:embeddedFont>
   </p:embeddedFontLst>
   <p:defaultTextStyle>
@@ -137,7 +139,7 @@
 <file path=ppt/revisionInfo.xml><?xml version="1.0" encoding="utf-8"?>
 <p1510:revInfo xmlns:a="http://schemas.openxmlformats.org/drawingml/2006/main" xmlns:r="http://schemas.openxmlformats.org/officeDocument/2006/relationships" xmlns:p1510="http://schemas.microsoft.com/office/powerpoint/2015/10/main">
   <p1510:revLst>
-    <p1510:client id="{206FD999-3345-4499-B91A-F1682E6111DF}" v="75" dt="2023-08-20T10:03:14.621"/>
+    <p1510:client id="{206FD999-3345-4499-B91A-F1682E6111DF}" v="81" dt="2023-08-20T21:51:18.507"/>
   </p1510:revLst>
 </p1510:revInfo>
 </file>
@@ -224,7 +226,7 @@
           <a:p>
             <a:fld id="{1D0A429A-90FE-4F33-893D-5F2AADB556A3}" type="datetimeFigureOut">
               <a:rPr lang="en-US"/>
-              <a:t>8/18/2023</a:t>
+              <a:t>8/21/2023</a:t>
             </a:fld>
             <a:endParaRPr lang="en-US"/>
           </a:p>
@@ -1036,7 +1038,7 @@
     </p:spTree>
     <p:extLst>
       <p:ext uri="{BB962C8B-B14F-4D97-AF65-F5344CB8AC3E}">
-        <p14:creationId xmlns:p14="http://schemas.microsoft.com/office/powerpoint/2010/main" val="1743608775"/>
+        <p14:creationId xmlns:p14="http://schemas.microsoft.com/office/powerpoint/2010/main" val="509559474"/>
       </p:ext>
     </p:extLst>
   </p:cSld>
@@ -1139,6 +1141,117 @@
             <a:fld id="{4F38AFD9-D5DB-4A47-A4BE-251B4DF1413A}" type="slidenum">
               <a:rPr lang="en-US"/>
               <a:t>6</a:t>
+            </a:fld>
+            <a:endParaRPr lang="en-US"/>
+          </a:p>
+        </p:txBody>
+      </p:sp>
+    </p:spTree>
+    <p:extLst>
+      <p:ext uri="{BB962C8B-B14F-4D97-AF65-F5344CB8AC3E}">
+        <p14:creationId xmlns:p14="http://schemas.microsoft.com/office/powerpoint/2010/main" val="1743608775"/>
+      </p:ext>
+    </p:extLst>
+  </p:cSld>
+  <p:clrMapOvr>
+    <a:masterClrMapping/>
+  </p:clrMapOvr>
+</p:notes>
+</file>
+
+<file path=ppt/notesSlides/notesSlide7.xml><?xml version="1.0" encoding="utf-8"?>
+<p:notes xmlns:a="http://schemas.openxmlformats.org/drawingml/2006/main" xmlns:r="http://schemas.openxmlformats.org/officeDocument/2006/relationships" xmlns:p="http://schemas.openxmlformats.org/presentationml/2006/main">
+  <p:cSld>
+    <p:spTree>
+      <p:nvGrpSpPr>
+        <p:cNvPr id="1" name=""/>
+        <p:cNvGrpSpPr/>
+        <p:nvPr/>
+      </p:nvGrpSpPr>
+      <p:grpSpPr>
+        <a:xfrm>
+          <a:off x="0" y="0"/>
+          <a:ext cx="0" cy="0"/>
+          <a:chOff x="0" y="0"/>
+          <a:chExt cx="0" cy="0"/>
+        </a:xfrm>
+      </p:grpSpPr>
+      <p:sp>
+        <p:nvSpPr>
+          <p:cNvPr id="2" name="Slide Image Placeholder 1"/>
+          <p:cNvSpPr>
+            <a:spLocks noGrp="1" noRot="1" noChangeAspect="1"/>
+          </p:cNvSpPr>
+          <p:nvPr>
+            <p:ph type="sldImg"/>
+          </p:nvPr>
+        </p:nvSpPr>
+        <p:spPr/>
+      </p:sp>
+      <p:sp>
+        <p:nvSpPr>
+          <p:cNvPr id="3" name="Notes Placeholder 2"/>
+          <p:cNvSpPr>
+            <a:spLocks noGrp="1"/>
+          </p:cNvSpPr>
+          <p:nvPr>
+            <p:ph type="body" idx="1"/>
+          </p:nvPr>
+        </p:nvSpPr>
+        <p:spPr/>
+        <p:txBody>
+          <a:bodyPr spcFirstLastPara="0" lIns="0" tIns="0" rIns="0" bIns="0" anchor="t"/>
+          <a:lstStyle/>
+          <a:p>
+            <a:pPr algn="l" hangingPunct="0">
+              <a:lnSpc>
+                <a:spcPct val="100000"/>
+              </a:lnSpc>
+            </a:pPr>
+            <a:r>
+              <a:rPr b="1">
+                <a:latin typeface="Arial"/>
+                <a:ea typeface="+mn-ea"/>
+                <a:cs typeface="Arial"/>
+              </a:rPr>
+              <a:t>Note title</a:t>
+            </a:r>
+          </a:p>
+          <a:p>
+            <a:pPr algn="l" hangingPunct="0">
+              <a:lnSpc>
+                <a:spcPct val="100000"/>
+              </a:lnSpc>
+            </a:pPr>
+            <a:r>
+              <a:rPr>
+                <a:latin typeface="Arial"/>
+                <a:ea typeface="+mn-ea"/>
+                <a:cs typeface="Arial"/>
+              </a:rPr>
+              <a:t>Type your notes here. They will be viewable in presenter view.</a:t>
+            </a:r>
+          </a:p>
+        </p:txBody>
+      </p:sp>
+      <p:sp>
+        <p:nvSpPr>
+          <p:cNvPr id="4" name="Slide Number Placeholder 3"/>
+          <p:cNvSpPr>
+            <a:spLocks noGrp="1"/>
+          </p:cNvSpPr>
+          <p:nvPr>
+            <p:ph type="sldNum" sz="quarter" idx="5"/>
+          </p:nvPr>
+        </p:nvSpPr>
+        <p:spPr/>
+        <p:txBody>
+          <a:bodyPr/>
+          <a:lstStyle/>
+          <a:p>
+            <a:fld id="{4F38AFD9-D5DB-4A47-A4BE-251B4DF1413A}" type="slidenum">
+              <a:rPr lang="en-US"/>
+              <a:t>7</a:t>
             </a:fld>
             <a:endParaRPr lang="en-US"/>
           </a:p>
@@ -1284,7 +1397,7 @@
           <a:p>
             <a:fld id="{F3A91E29-D66E-481E-8EDC-43396358AD9A}" type="datetime1">
               <a:rPr lang="en-US" smtClean="0"/>
-              <a:t>8/18/2023</a:t>
+              <a:t>8/21/2023</a:t>
             </a:fld>
             <a:endParaRPr/>
           </a:p>
@@ -1452,7 +1565,7 @@
           <a:p>
             <a:fld id="{332FD377-67F7-4582-9193-686FCBDA3FDA}" type="datetime1">
               <a:rPr lang="en-US" smtClean="0"/>
-              <a:t>8/18/2023</a:t>
+              <a:t>8/21/2023</a:t>
             </a:fld>
             <a:endParaRPr lang="en-US"/>
           </a:p>
@@ -1631,7 +1744,7 @@
           <a:p>
             <a:fld id="{AC759F89-47DF-46B0-A6ED-FC6436CCAACD}" type="datetime1">
               <a:rPr lang="en-US" smtClean="0"/>
-              <a:t>8/18/2023</a:t>
+              <a:t>8/21/2023</a:t>
             </a:fld>
             <a:endParaRPr lang="en-US"/>
           </a:p>
@@ -1800,7 +1913,7 @@
           <a:p>
             <a:fld id="{DB27B577-DC43-414E-8917-677CA7E546AA}" type="datetime1">
               <a:rPr lang="en-US" smtClean="0"/>
-              <a:t>8/18/2023</a:t>
+              <a:t>8/21/2023</a:t>
             </a:fld>
             <a:endParaRPr lang="en-US"/>
           </a:p>
@@ -2046,7 +2159,7 @@
           <a:p>
             <a:fld id="{EC7DA2C2-AF4F-4143-900C-5A552ACEC641}" type="datetime1">
               <a:rPr lang="en-US" smtClean="0"/>
-              <a:t>8/18/2023</a:t>
+              <a:t>8/21/2023</a:t>
             </a:fld>
             <a:endParaRPr lang="en-US"/>
           </a:p>
@@ -2332,7 +2445,7 @@
           <a:p>
             <a:fld id="{94DD5FD0-D487-4765-8827-E3E1DD86C9F8}" type="datetime1">
               <a:rPr lang="en-US" smtClean="0"/>
-              <a:t>8/18/2023</a:t>
+              <a:t>8/21/2023</a:t>
             </a:fld>
             <a:endParaRPr lang="en-US"/>
           </a:p>
@@ -2752,7 +2865,7 @@
           <a:p>
             <a:fld id="{E57BDEE7-371E-4428-9643-858756161BAF}" type="datetime1">
               <a:rPr lang="en-US" smtClean="0"/>
-              <a:t>8/18/2023</a:t>
+              <a:t>8/21/2023</a:t>
             </a:fld>
             <a:endParaRPr lang="en-US"/>
           </a:p>
@@ -2870,7 +2983,7 @@
           <a:p>
             <a:fld id="{F019F8D3-725B-4F19-8285-2E55B3A96620}" type="datetime1">
               <a:rPr lang="en-US" smtClean="0"/>
-              <a:t>8/18/2023</a:t>
+              <a:t>8/21/2023</a:t>
             </a:fld>
             <a:endParaRPr lang="en-US"/>
           </a:p>
@@ -2966,7 +3079,7 @@
           <a:p>
             <a:fld id="{71D11987-42F6-42AD-950C-2C620C410C3B}" type="datetime1">
               <a:rPr lang="en-US" smtClean="0"/>
-              <a:t>8/18/2023</a:t>
+              <a:t>8/21/2023</a:t>
             </a:fld>
             <a:endParaRPr lang="en-US"/>
           </a:p>
@@ -3242,7 +3355,7 @@
           <a:p>
             <a:fld id="{CF89AC38-45B9-4E35-88F4-638092101A7B}" type="datetime1">
               <a:rPr lang="en-US" smtClean="0"/>
-              <a:t>8/18/2023</a:t>
+              <a:t>8/21/2023</a:t>
             </a:fld>
             <a:endParaRPr lang="en-US"/>
           </a:p>
@@ -3495,7 +3608,7 @@
           <a:p>
             <a:fld id="{233D51A2-C3E7-4645-81D3-54138AB02DD6}" type="datetime1">
               <a:rPr lang="en-US" smtClean="0"/>
-              <a:t>8/18/2023</a:t>
+              <a:t>8/21/2023</a:t>
             </a:fld>
             <a:endParaRPr lang="en-US"/>
           </a:p>
@@ -3707,7 +3820,7 @@
           <a:p>
             <a:fld id="{D3EB915F-BFBB-445F-B0D6-BF6F20A92730}" type="datetime1">
               <a:rPr lang="en-US" smtClean="0"/>
-              <a:t>8/18/2023</a:t>
+              <a:t>8/21/2023</a:t>
             </a:fld>
             <a:endParaRPr lang="en-US"/>
           </a:p>
@@ -4408,10 +4521,10 @@
       </p:sp>
       <p:pic>
         <p:nvPicPr>
-          <p:cNvPr id="16" name="Samsung Galaxy S21">
+          <p:cNvPr id="6" name="Samsung Galaxy S21">
             <a:extLst>
               <a:ext uri="{FF2B5EF4-FFF2-40B4-BE49-F238E27FC236}">
-                <a16:creationId xmlns:a16="http://schemas.microsoft.com/office/drawing/2014/main" id="{AA0E562C-5FB1-547A-835E-FAA01FE40331}"/>
+                <a16:creationId xmlns:a16="http://schemas.microsoft.com/office/drawing/2014/main" id="{B23A681B-3681-ADCF-FBA5-844076F8EF32}"/>
               </a:ext>
             </a:extLst>
           </p:cNvPr>
@@ -4426,8 +4539,8 @@
         </p:blipFill>
         <p:spPr>
           <a:xfrm>
-            <a:off x="6650182" y="-190500"/>
-            <a:ext cx="5403273" cy="7992440"/>
+            <a:off x="6505575" y="0"/>
+            <a:ext cx="5469548" cy="7596554"/>
           </a:xfrm>
           <a:prstGeom prst="rect">
             <a:avLst/>
@@ -6665,6 +6778,320 @@
 </file>
 
 <file path=ppt/slides/slide5.xml><?xml version="1.0" encoding="utf-8"?>
+<p:sld xmlns:a="http://schemas.openxmlformats.org/drawingml/2006/main" xmlns:r="http://schemas.openxmlformats.org/officeDocument/2006/relationships" xmlns:p="http://schemas.openxmlformats.org/presentationml/2006/main">
+  <p:cSld>
+    <p:bg>
+      <p:bgPr>
+        <a:solidFill>
+          <a:srgbClr val="FFFFFF"/>
+        </a:solidFill>
+        <a:effectLst/>
+      </p:bgPr>
+    </p:bg>
+    <p:spTree>
+      <p:nvGrpSpPr>
+        <p:cNvPr id="1" name="Demo repo"/>
+        <p:cNvGrpSpPr/>
+        <p:nvPr/>
+      </p:nvGrpSpPr>
+      <p:grpSpPr>
+        <a:xfrm>
+          <a:off x="0" y="0"/>
+          <a:ext cx="0" cy="0"/>
+          <a:chOff x="0" y="0"/>
+          <a:chExt cx="0" cy="0"/>
+        </a:xfrm>
+      </p:grpSpPr>
+      <p:pic>
+        <p:nvPicPr>
+          <p:cNvPr id="2" name="TTC_logo"/>
+          <p:cNvPicPr/>
+          <p:nvPr/>
+        </p:nvPicPr>
+        <p:blipFill rotWithShape="1">
+          <a:blip r:embed="rId3"/>
+          <a:stretch>
+            <a:fillRect/>
+          </a:stretch>
+        </p:blipFill>
+        <p:spPr>
+          <a:xfrm>
+            <a:off x="10982325" y="6629400"/>
+            <a:ext cx="1666875" cy="685800"/>
+          </a:xfrm>
+          <a:prstGeom prst="rect">
+            <a:avLst/>
+          </a:prstGeom>
+        </p:spPr>
+      </p:pic>
+      <p:pic>
+        <p:nvPicPr>
+          <p:cNvPr id="3" name="Shape-1 copy 1"/>
+          <p:cNvPicPr/>
+          <p:nvPr/>
+        </p:nvPicPr>
+        <p:blipFill rotWithShape="1">
+          <a:blip r:embed="rId4"/>
+          <a:stretch>
+            <a:fillRect/>
+          </a:stretch>
+        </p:blipFill>
+        <p:spPr>
+          <a:xfrm>
+            <a:off x="-85725" y="-85846"/>
+            <a:ext cx="843935" cy="7484173"/>
+          </a:xfrm>
+          <a:prstGeom prst="rect">
+            <a:avLst/>
+          </a:prstGeom>
+        </p:spPr>
+      </p:pic>
+      <p:sp>
+        <p:nvSpPr>
+          <p:cNvPr id="4" name="Rectangle 3"/>
+          <p:cNvSpPr/>
+          <p:nvPr/>
+        </p:nvSpPr>
+        <p:spPr>
+          <a:xfrm rot="-5400000">
+            <a:off x="-1019175" y="1447800"/>
+            <a:ext cx="2794265" cy="476250"/>
+          </a:xfrm>
+          <a:prstGeom prst="rect">
+            <a:avLst/>
+          </a:prstGeom>
+        </p:spPr>
+        <p:txBody>
+          <a:bodyPr spcFirstLastPara="0" lIns="95250" tIns="95250" rIns="95250" bIns="0" anchor="t"/>
+          <a:lstStyle/>
+          <a:p>
+            <a:pPr algn="r" hangingPunct="0">
+              <a:lnSpc>
+                <a:spcPct val="100000"/>
+              </a:lnSpc>
+            </a:pPr>
+            <a:r>
+              <a:rPr sz="1800" b="1" dirty="0">
+                <a:solidFill>
+                  <a:srgbClr val="F53C46"/>
+                </a:solidFill>
+                <a:latin typeface="Poppins"/>
+                <a:ea typeface="+mn-ea"/>
+                <a:cs typeface="Poppins"/>
+              </a:rPr>
+              <a:t>Shelly Mutu-Grigg</a:t>
+            </a:r>
+          </a:p>
+        </p:txBody>
+      </p:sp>
+      <p:sp>
+        <p:nvSpPr>
+          <p:cNvPr id="7" name="Rectangle 6"/>
+          <p:cNvSpPr/>
+          <p:nvPr/>
+        </p:nvSpPr>
+        <p:spPr>
+          <a:xfrm>
+            <a:off x="801056" y="1223312"/>
+            <a:ext cx="11086144" cy="1143000"/>
+          </a:xfrm>
+          <a:prstGeom prst="rect">
+            <a:avLst/>
+          </a:prstGeom>
+        </p:spPr>
+        <p:txBody>
+          <a:bodyPr spcFirstLastPara="0" lIns="95250" tIns="95250" rIns="95250" bIns="0" anchor="t"/>
+          <a:lstStyle/>
+          <a:p>
+            <a:pPr marL="72000" algn="ctr" hangingPunct="0">
+              <a:spcBef>
+                <a:spcPts val="1200"/>
+              </a:spcBef>
+            </a:pPr>
+            <a:r>
+              <a:rPr lang="en-US" sz="3600" b="1" dirty="0">
+                <a:latin typeface="Poppins"/>
+                <a:ea typeface="+mn-ea"/>
+                <a:cs typeface="Poppins"/>
+              </a:rPr>
+              <a:t>Amazon.com Website</a:t>
+            </a:r>
+            <a:endParaRPr sz="3600" b="1" dirty="0">
+              <a:latin typeface="Poppins"/>
+              <a:ea typeface="+mn-ea"/>
+              <a:cs typeface="Poppins"/>
+              <a:hlinkClick r:id="rId5">
+                <a:extLst>
+                  <a:ext uri="{A12FA001-AC4F-418D-AE19-62706E023703}">
+                    <ahyp:hlinkClr xmlns:ahyp="http://schemas.microsoft.com/office/drawing/2018/hyperlinkcolor" val="tx"/>
+                  </a:ext>
+                </a:extLst>
+              </a:hlinkClick>
+            </a:endParaRPr>
+          </a:p>
+        </p:txBody>
+      </p:sp>
+      <p:sp>
+        <p:nvSpPr>
+          <p:cNvPr id="9" name="Rectangle 8"/>
+          <p:cNvSpPr/>
+          <p:nvPr/>
+        </p:nvSpPr>
+        <p:spPr>
+          <a:xfrm>
+            <a:off x="3463968" y="685362"/>
+            <a:ext cx="5760320" cy="419100"/>
+          </a:xfrm>
+          <a:prstGeom prst="rect">
+            <a:avLst/>
+          </a:prstGeom>
+        </p:spPr>
+        <p:txBody>
+          <a:bodyPr spcFirstLastPara="0" lIns="95250" tIns="95250" rIns="95250" bIns="0" anchor="t"/>
+          <a:lstStyle/>
+          <a:p>
+            <a:pPr algn="ctr" hangingPunct="0">
+              <a:lnSpc>
+                <a:spcPct val="83333"/>
+              </a:lnSpc>
+              <a:spcBef>
+                <a:spcPct val="6667"/>
+              </a:spcBef>
+            </a:pPr>
+            <a:r>
+              <a:rPr lang="en-US" sz="1800" dirty="0">
+                <a:solidFill>
+                  <a:srgbClr val="F53C46"/>
+                </a:solidFill>
+                <a:latin typeface="Poppins"/>
+                <a:ea typeface="+mn-ea"/>
+                <a:cs typeface="Poppins"/>
+              </a:rPr>
+              <a:t>Demonstration</a:t>
+            </a:r>
+            <a:endParaRPr sz="1800" dirty="0">
+              <a:solidFill>
+                <a:srgbClr val="F53C46"/>
+              </a:solidFill>
+              <a:latin typeface="Poppins"/>
+              <a:ea typeface="+mn-ea"/>
+              <a:cs typeface="Poppins"/>
+            </a:endParaRPr>
+          </a:p>
+        </p:txBody>
+      </p:sp>
+      <p:pic>
+        <p:nvPicPr>
+          <p:cNvPr id="11" name="ArrowOutline21">
+            <a:extLst>
+              <a:ext uri="{FF2B5EF4-FFF2-40B4-BE49-F238E27FC236}">
+                <a16:creationId xmlns:a16="http://schemas.microsoft.com/office/drawing/2014/main" id="{E43812CE-95E5-9A0B-8276-E3CD52D565FD}"/>
+              </a:ext>
+            </a:extLst>
+          </p:cNvPr>
+          <p:cNvPicPr/>
+          <p:nvPr/>
+        </p:nvPicPr>
+        <p:blipFill rotWithShape="1">
+          <a:blip r:embed="rId6"/>
+          <a:stretch>
+            <a:fillRect/>
+          </a:stretch>
+        </p:blipFill>
+        <p:spPr>
+          <a:xfrm>
+            <a:off x="123824" y="6835763"/>
+            <a:ext cx="476251" cy="381289"/>
+          </a:xfrm>
+          <a:prstGeom prst="rect">
+            <a:avLst/>
+          </a:prstGeom>
+        </p:spPr>
+      </p:pic>
+      <p:sp>
+        <p:nvSpPr>
+          <p:cNvPr id="12" name="Slide Number Placeholder 11">
+            <a:extLst>
+              <a:ext uri="{FF2B5EF4-FFF2-40B4-BE49-F238E27FC236}">
+                <a16:creationId xmlns:a16="http://schemas.microsoft.com/office/drawing/2014/main" id="{B9E11066-C581-269D-3F27-15B6E341B425}"/>
+              </a:ext>
+            </a:extLst>
+          </p:cNvPr>
+          <p:cNvSpPr>
+            <a:spLocks noGrp="1"/>
+          </p:cNvSpPr>
+          <p:nvPr>
+            <p:ph type="sldNum" sz="quarter" idx="12"/>
+          </p:nvPr>
+        </p:nvSpPr>
+        <p:spPr>
+          <a:xfrm>
+            <a:off x="10707056" y="6789737"/>
+            <a:ext cx="2133600" cy="365125"/>
+          </a:xfrm>
+        </p:spPr>
+        <p:txBody>
+          <a:bodyPr/>
+          <a:lstStyle/>
+          <a:p>
+            <a:fld id="{6CB18C70-803E-428A-BAB3-289BE172EF8D}" type="slidenum">
+              <a:rPr lang="en-US" smtClean="0"/>
+              <a:t>5</a:t>
+            </a:fld>
+            <a:endParaRPr lang="en-US" dirty="0"/>
+          </a:p>
+        </p:txBody>
+      </p:sp>
+      <p:pic>
+        <p:nvPicPr>
+          <p:cNvPr id="6" name="Picture 5" descr="A computer screen shot of a program&#10;&#10;Description automatically generated">
+            <a:extLst>
+              <a:ext uri="{FF2B5EF4-FFF2-40B4-BE49-F238E27FC236}">
+                <a16:creationId xmlns:a16="http://schemas.microsoft.com/office/drawing/2014/main" id="{98FE35F7-F7EF-F866-7D0C-D93ABFB03666}"/>
+              </a:ext>
+            </a:extLst>
+          </p:cNvPr>
+          <p:cNvPicPr>
+            <a:picLocks noChangeAspect="1"/>
+          </p:cNvPicPr>
+          <p:nvPr/>
+        </p:nvPicPr>
+        <p:blipFill>
+          <a:blip r:embed="rId7">
+            <a:extLst>
+              <a:ext uri="{28A0092B-C50C-407E-A947-70E740481C1C}">
+                <a14:useLocalDpi xmlns:a14="http://schemas.microsoft.com/office/drawing/2010/main" val="0"/>
+              </a:ext>
+            </a:extLst>
+          </a:blip>
+          <a:stretch>
+            <a:fillRect/>
+          </a:stretch>
+        </p:blipFill>
+        <p:spPr>
+          <a:xfrm>
+            <a:off x="2751882" y="2098681"/>
+            <a:ext cx="7817539" cy="4798351"/>
+          </a:xfrm>
+          <a:prstGeom prst="rect">
+            <a:avLst/>
+          </a:prstGeom>
+        </p:spPr>
+      </p:pic>
+    </p:spTree>
+    <p:extLst>
+      <p:ext uri="{BB962C8B-B14F-4D97-AF65-F5344CB8AC3E}">
+        <p14:creationId xmlns:p14="http://schemas.microsoft.com/office/powerpoint/2010/main" val="1792499872"/>
+      </p:ext>
+    </p:extLst>
+  </p:cSld>
+  <p:clrMapOvr>
+    <a:masterClrMapping/>
+  </p:clrMapOvr>
+</p:sld>
+</file>
+
+<file path=ppt/slides/slide6.xml><?xml version="1.0" encoding="utf-8"?>
 <p:sld xmlns:a="http://schemas.openxmlformats.org/drawingml/2006/main" xmlns:r="http://schemas.openxmlformats.org/officeDocument/2006/relationships" xmlns:p="http://schemas.openxmlformats.org/presentationml/2006/main">
   <p:cSld>
     <p:bg>
@@ -7255,7 +7682,7 @@
           <a:p>
             <a:fld id="{6CB18C70-803E-428A-BAB3-289BE172EF8D}" type="slidenum">
               <a:rPr lang="en-US" smtClean="0"/>
-              <a:t>5</a:t>
+              <a:t>6</a:t>
             </a:fld>
             <a:endParaRPr lang="en-US"/>
           </a:p>
@@ -7623,10 +8050,10 @@
       </p:grpSp>
       <p:grpSp>
         <p:nvGrpSpPr>
-          <p:cNvPr id="58" name="Group 57">
+          <p:cNvPr id="7" name="Group 6">
             <a:extLst>
               <a:ext uri="{FF2B5EF4-FFF2-40B4-BE49-F238E27FC236}">
-                <a16:creationId xmlns:a16="http://schemas.microsoft.com/office/drawing/2014/main" id="{457F4A7E-6377-2AE3-ED3A-267D96851CAF}"/>
+                <a16:creationId xmlns:a16="http://schemas.microsoft.com/office/drawing/2014/main" id="{A95BB3E9-72E9-F292-8879-27F7401991FE}"/>
               </a:ext>
             </a:extLst>
           </p:cNvPr>
@@ -7635,10 +8062,10 @@
         </p:nvGrpSpPr>
         <p:grpSpPr>
           <a:xfrm>
-            <a:off x="6588629" y="3432518"/>
-            <a:ext cx="2811074" cy="350694"/>
-            <a:chOff x="6588629" y="3052090"/>
-            <a:chExt cx="2811074" cy="350694"/>
+            <a:off x="6588629" y="3432517"/>
+            <a:ext cx="5134106" cy="443305"/>
+            <a:chOff x="6588629" y="3432517"/>
+            <a:chExt cx="5134106" cy="443305"/>
           </a:xfrm>
         </p:grpSpPr>
         <p:sp>
@@ -7655,8 +8082,8 @@
           </p:nvSpPr>
           <p:spPr>
             <a:xfrm>
-              <a:off x="6821913" y="3052090"/>
-              <a:ext cx="2577790" cy="350694"/>
+              <a:off x="6821912" y="3432517"/>
+              <a:ext cx="4900823" cy="443305"/>
             </a:xfrm>
             <a:prstGeom prst="rect">
               <a:avLst/>
@@ -7675,7 +8102,7 @@
                   <a:latin typeface="Poppins"/>
                   <a:cs typeface="Poppins"/>
                 </a:rPr>
-                <a:t>Stack runtime memory</a:t>
+                <a:t>Stack (compiler) and Heap (dev) runtime memory</a:t>
               </a:r>
             </a:p>
           </p:txBody>
@@ -7700,7 +8127,7 @@
           </p:blipFill>
           <p:spPr>
             <a:xfrm>
-              <a:off x="6588629" y="3175034"/>
+              <a:off x="6588629" y="3555462"/>
               <a:ext cx="181441" cy="182949"/>
             </a:xfrm>
             <a:prstGeom prst="rect">
@@ -7898,7 +8325,7 @@
 </p:sld>
 </file>
 
-<file path=ppt/slides/slide6.xml><?xml version="1.0" encoding="utf-8"?>
+<file path=ppt/slides/slide7.xml><?xml version="1.0" encoding="utf-8"?>
 <p:sld xmlns:a="http://schemas.openxmlformats.org/drawingml/2006/main" xmlns:r="http://schemas.openxmlformats.org/officeDocument/2006/relationships" xmlns:p="http://schemas.openxmlformats.org/presentationml/2006/main">
   <p:cSld>
     <p:bg>
@@ -8192,7 +8619,7 @@
           <a:p>
             <a:fld id="{6CB18C70-803E-428A-BAB3-289BE172EF8D}" type="slidenum">
               <a:rPr lang="en-US" smtClean="0"/>
-              <a:t>6</a:t>
+              <a:t>7</a:t>
             </a:fld>
             <a:endParaRPr lang="en-US"/>
           </a:p>

</xml_diff>